<commit_message>
added in remove column
</commit_message>
<xml_diff>
--- a/icons/FHAST_add_col.pptx
+++ b/icons/FHAST_add_col.pptx
@@ -243,7 +243,7 @@
           <a:p>
             <a:fld id="{9F0F061E-EF7A-43F5-ABC0-65E887E39644}" type="datetimeFigureOut">
               <a:rPr lang="en-UG" smtClean="0"/>
-              <a:t>11/07/2024</a:t>
+              <a:t>22/08/2024</a:t>
             </a:fld>
             <a:endParaRPr lang="en-UG"/>
           </a:p>
@@ -413,7 +413,7 @@
           <a:p>
             <a:fld id="{9F0F061E-EF7A-43F5-ABC0-65E887E39644}" type="datetimeFigureOut">
               <a:rPr lang="en-UG" smtClean="0"/>
-              <a:t>11/07/2024</a:t>
+              <a:t>22/08/2024</a:t>
             </a:fld>
             <a:endParaRPr lang="en-UG"/>
           </a:p>
@@ -593,7 +593,7 @@
           <a:p>
             <a:fld id="{9F0F061E-EF7A-43F5-ABC0-65E887E39644}" type="datetimeFigureOut">
               <a:rPr lang="en-UG" smtClean="0"/>
-              <a:t>11/07/2024</a:t>
+              <a:t>22/08/2024</a:t>
             </a:fld>
             <a:endParaRPr lang="en-UG"/>
           </a:p>
@@ -763,7 +763,7 @@
           <a:p>
             <a:fld id="{9F0F061E-EF7A-43F5-ABC0-65E887E39644}" type="datetimeFigureOut">
               <a:rPr lang="en-UG" smtClean="0"/>
-              <a:t>11/07/2024</a:t>
+              <a:t>22/08/2024</a:t>
             </a:fld>
             <a:endParaRPr lang="en-UG"/>
           </a:p>
@@ -1009,7 +1009,7 @@
           <a:p>
             <a:fld id="{9F0F061E-EF7A-43F5-ABC0-65E887E39644}" type="datetimeFigureOut">
               <a:rPr lang="en-UG" smtClean="0"/>
-              <a:t>11/07/2024</a:t>
+              <a:t>22/08/2024</a:t>
             </a:fld>
             <a:endParaRPr lang="en-UG"/>
           </a:p>
@@ -1241,7 +1241,7 @@
           <a:p>
             <a:fld id="{9F0F061E-EF7A-43F5-ABC0-65E887E39644}" type="datetimeFigureOut">
               <a:rPr lang="en-UG" smtClean="0"/>
-              <a:t>11/07/2024</a:t>
+              <a:t>22/08/2024</a:t>
             </a:fld>
             <a:endParaRPr lang="en-UG"/>
           </a:p>
@@ -1608,7 +1608,7 @@
           <a:p>
             <a:fld id="{9F0F061E-EF7A-43F5-ABC0-65E887E39644}" type="datetimeFigureOut">
               <a:rPr lang="en-UG" smtClean="0"/>
-              <a:t>11/07/2024</a:t>
+              <a:t>22/08/2024</a:t>
             </a:fld>
             <a:endParaRPr lang="en-UG"/>
           </a:p>
@@ -1726,7 +1726,7 @@
           <a:p>
             <a:fld id="{9F0F061E-EF7A-43F5-ABC0-65E887E39644}" type="datetimeFigureOut">
               <a:rPr lang="en-UG" smtClean="0"/>
-              <a:t>11/07/2024</a:t>
+              <a:t>22/08/2024</a:t>
             </a:fld>
             <a:endParaRPr lang="en-UG"/>
           </a:p>
@@ -1821,7 +1821,7 @@
           <a:p>
             <a:fld id="{9F0F061E-EF7A-43F5-ABC0-65E887E39644}" type="datetimeFigureOut">
               <a:rPr lang="en-UG" smtClean="0"/>
-              <a:t>11/07/2024</a:t>
+              <a:t>22/08/2024</a:t>
             </a:fld>
             <a:endParaRPr lang="en-UG"/>
           </a:p>
@@ -2098,7 +2098,7 @@
           <a:p>
             <a:fld id="{9F0F061E-EF7A-43F5-ABC0-65E887E39644}" type="datetimeFigureOut">
               <a:rPr lang="en-UG" smtClean="0"/>
-              <a:t>11/07/2024</a:t>
+              <a:t>22/08/2024</a:t>
             </a:fld>
             <a:endParaRPr lang="en-UG"/>
           </a:p>
@@ -2355,7 +2355,7 @@
           <a:p>
             <a:fld id="{9F0F061E-EF7A-43F5-ABC0-65E887E39644}" type="datetimeFigureOut">
               <a:rPr lang="en-UG" smtClean="0"/>
-              <a:t>11/07/2024</a:t>
+              <a:t>22/08/2024</a:t>
             </a:fld>
             <a:endParaRPr lang="en-UG"/>
           </a:p>
@@ -2568,7 +2568,7 @@
           <a:p>
             <a:fld id="{9F0F061E-EF7A-43F5-ABC0-65E887E39644}" type="datetimeFigureOut">
               <a:rPr lang="en-UG" smtClean="0"/>
-              <a:t>11/07/2024</a:t>
+              <a:t>22/08/2024</a:t>
             </a:fld>
             <a:endParaRPr lang="en-UG"/>
           </a:p>
@@ -3311,10 +3311,62 @@
         </p:nvSpPr>
         <p:spPr>
           <a:xfrm>
-            <a:off x="-208192" y="1257301"/>
+            <a:off x="-208192" y="492577"/>
             <a:ext cx="4204607" cy="4147457"/>
           </a:xfrm>
           <a:prstGeom prst="mathPlus">
+            <a:avLst/>
+          </a:prstGeom>
+          <a:solidFill>
+            <a:srgbClr val="00B050"/>
+          </a:solidFill>
+          <a:ln w="38100"/>
+        </p:spPr>
+        <p:style>
+          <a:lnRef idx="1">
+            <a:schemeClr val="dk1"/>
+          </a:lnRef>
+          <a:fillRef idx="2">
+            <a:schemeClr val="dk1"/>
+          </a:fillRef>
+          <a:effectRef idx="1">
+            <a:schemeClr val="dk1"/>
+          </a:effectRef>
+          <a:fontRef idx="minor">
+            <a:schemeClr val="dk1"/>
+          </a:fontRef>
+        </p:style>
+        <p:txBody>
+          <a:bodyPr rtlCol="0" anchor="ctr"/>
+          <a:lstStyle/>
+          <a:p>
+            <a:pPr algn="ctr"/>
+            <a:endParaRPr lang="en-UG">
+              <a:solidFill>
+                <a:schemeClr val="dk1"/>
+              </a:solidFill>
+            </a:endParaRPr>
+          </a:p>
+        </p:txBody>
+      </p:sp>
+      <p:sp>
+        <p:nvSpPr>
+          <p:cNvPr id="2" name="Rectangle 1">
+            <a:extLst>
+              <a:ext uri="{FF2B5EF4-FFF2-40B4-BE49-F238E27FC236}">
+                <a16:creationId xmlns:a16="http://schemas.microsoft.com/office/drawing/2014/main" id="{7E7389EB-F097-4C9C-3AC5-B88F364B3F22}"/>
+              </a:ext>
+            </a:extLst>
+          </p:cNvPr>
+          <p:cNvSpPr/>
+          <p:nvPr/>
+        </p:nvSpPr>
+        <p:spPr>
+          <a:xfrm>
+            <a:off x="348338" y="4463146"/>
+            <a:ext cx="3096985" cy="990597"/>
+          </a:xfrm>
+          <a:prstGeom prst="rect">
             <a:avLst/>
           </a:prstGeom>
           <a:solidFill>

</xml_diff>